<commit_message>
Updated Resume & PPT.
</commit_message>
<xml_diff>
--- a/docs/Thiruppathi_Muthukumar.pptx
+++ b/docs/Thiruppathi_Muthukumar.pptx
@@ -141,6 +141,22 @@
       </a:defRPr>
     </a:lvl9pPr>
   </p:defaultTextStyle>
+  <p:extLst>
+    <p:ext uri="{EFAFB233-063F-42B5-8137-9DF3F51BA10A}">
+      <p15:sldGuideLst xmlns:p15="http://schemas.microsoft.com/office/powerpoint/2012/main">
+        <p15:guide id="1" orient="horz" pos="2160">
+          <p15:clr>
+            <a:srgbClr val="A4A3A4"/>
+          </p15:clr>
+        </p15:guide>
+        <p15:guide id="2" pos="3120">
+          <p15:clr>
+            <a:srgbClr val="A4A3A4"/>
+          </p15:clr>
+        </p15:guide>
+      </p15:sldGuideLst>
+    </p:ext>
+  </p:extLst>
 </p:presentation>
 </file>
 
@@ -17615,7 +17631,7 @@
   <p:timing>
     <p:tnLst>
       <p:par>
-        <p:cTn xmlns:p14="http://schemas.microsoft.com/office/powerpoint/2010/main" id="1" dur="indefinite" restart="never" nodeType="tmRoot"/>
+        <p:cTn id="1" dur="indefinite" restart="never" nodeType="tmRoot"/>
       </p:par>
     </p:tnLst>
   </p:timing>
@@ -18557,7 +18573,7 @@
   <p:timing>
     <p:tnLst>
       <p:par>
-        <p:cTn xmlns:p14="http://schemas.microsoft.com/office/powerpoint/2010/main" id="1" dur="indefinite" restart="never" nodeType="tmRoot"/>
+        <p:cTn id="1" dur="indefinite" restart="never" nodeType="tmRoot"/>
       </p:par>
     </p:tnLst>
   </p:timing>
@@ -18981,7 +18997,7 @@
   <p:timing>
     <p:tnLst>
       <p:par>
-        <p:cTn xmlns:p14="http://schemas.microsoft.com/office/powerpoint/2010/main" id="1" dur="indefinite" restart="never" nodeType="tmRoot"/>
+        <p:cTn id="1" dur="indefinite" restart="never" nodeType="tmRoot"/>
       </p:par>
     </p:tnLst>
   </p:timing>
@@ -19169,7 +19185,7 @@
           <a:p>
             <a:fld id="{9A65DDBD-D2F9-422F-88EF-B46BBBA31C54}" type="datetimeFigureOut">
               <a:rPr lang="en-GB" smtClean="0"/>
-              <a:t>28/09/15</a:t>
+              <a:t>15/06/2016</a:t>
             </a:fld>
             <a:endParaRPr lang="en-GB" dirty="0"/>
           </a:p>
@@ -19339,7 +19355,7 @@
           <a:p>
             <a:fld id="{9A65DDBD-D2F9-422F-88EF-B46BBBA31C54}" type="datetimeFigureOut">
               <a:rPr lang="en-GB" smtClean="0"/>
-              <a:t>28/09/15</a:t>
+              <a:t>15/06/2016</a:t>
             </a:fld>
             <a:endParaRPr lang="en-GB" dirty="0"/>
           </a:p>
@@ -19585,7 +19601,7 @@
           <a:p>
             <a:fld id="{9A65DDBD-D2F9-422F-88EF-B46BBBA31C54}" type="datetimeFigureOut">
               <a:rPr lang="en-GB" smtClean="0"/>
-              <a:t>28/09/15</a:t>
+              <a:t>15/06/2016</a:t>
             </a:fld>
             <a:endParaRPr lang="en-GB" dirty="0"/>
           </a:p>
@@ -19873,7 +19889,7 @@
           <a:p>
             <a:fld id="{9A65DDBD-D2F9-422F-88EF-B46BBBA31C54}" type="datetimeFigureOut">
               <a:rPr lang="en-GB" smtClean="0"/>
-              <a:t>28/09/15</a:t>
+              <a:t>15/06/2016</a:t>
             </a:fld>
             <a:endParaRPr lang="en-GB" dirty="0"/>
           </a:p>
@@ -20295,7 +20311,7 @@
           <a:p>
             <a:fld id="{9A65DDBD-D2F9-422F-88EF-B46BBBA31C54}" type="datetimeFigureOut">
               <a:rPr lang="en-GB" smtClean="0"/>
-              <a:t>28/09/15</a:t>
+              <a:t>15/06/2016</a:t>
             </a:fld>
             <a:endParaRPr lang="en-GB" dirty="0"/>
           </a:p>
@@ -20413,7 +20429,7 @@
           <a:p>
             <a:fld id="{9A65DDBD-D2F9-422F-88EF-B46BBBA31C54}" type="datetimeFigureOut">
               <a:rPr lang="en-GB" smtClean="0"/>
-              <a:t>28/09/15</a:t>
+              <a:t>15/06/2016</a:t>
             </a:fld>
             <a:endParaRPr lang="en-GB" dirty="0"/>
           </a:p>
@@ -20508,7 +20524,7 @@
           <a:p>
             <a:fld id="{9A65DDBD-D2F9-422F-88EF-B46BBBA31C54}" type="datetimeFigureOut">
               <a:rPr lang="en-GB" smtClean="0"/>
-              <a:t>28/09/15</a:t>
+              <a:t>15/06/2016</a:t>
             </a:fld>
             <a:endParaRPr lang="en-GB" dirty="0"/>
           </a:p>
@@ -20785,7 +20801,7 @@
           <a:p>
             <a:fld id="{9A65DDBD-D2F9-422F-88EF-B46BBBA31C54}" type="datetimeFigureOut">
               <a:rPr lang="en-GB" smtClean="0"/>
-              <a:t>28/09/15</a:t>
+              <a:t>15/06/2016</a:t>
             </a:fld>
             <a:endParaRPr lang="en-GB" dirty="0"/>
           </a:p>
@@ -21905,7 +21921,7 @@
           <a:p>
             <a:fld id="{9A65DDBD-D2F9-422F-88EF-B46BBBA31C54}" type="datetimeFigureOut">
               <a:rPr lang="en-GB" smtClean="0"/>
-              <a:t>28/09/15</a:t>
+              <a:t>15/06/2016</a:t>
             </a:fld>
             <a:endParaRPr lang="en-GB" dirty="0"/>
           </a:p>
@@ -22075,7 +22091,7 @@
           <a:p>
             <a:fld id="{9A65DDBD-D2F9-422F-88EF-B46BBBA31C54}" type="datetimeFigureOut">
               <a:rPr lang="en-GB" smtClean="0"/>
-              <a:t>28/09/15</a:t>
+              <a:t>15/06/2016</a:t>
             </a:fld>
             <a:endParaRPr lang="en-GB" dirty="0"/>
           </a:p>
@@ -22255,7 +22271,7 @@
           <a:p>
             <a:fld id="{9A65DDBD-D2F9-422F-88EF-B46BBBA31C54}" type="datetimeFigureOut">
               <a:rPr lang="en-GB" smtClean="0"/>
-              <a:t>28/09/15</a:t>
+              <a:t>15/06/2016</a:t>
             </a:fld>
             <a:endParaRPr lang="en-GB" dirty="0"/>
           </a:p>
@@ -29373,7 +29389,7 @@
           <a:p>
             <a:fld id="{9A65DDBD-D2F9-422F-88EF-B46BBBA31C54}" type="datetimeFigureOut">
               <a:rPr lang="en-GB" smtClean="0"/>
-              <a:t>28/09/15</a:t>
+              <a:t>15/06/2016</a:t>
             </a:fld>
             <a:endParaRPr lang="en-GB" dirty="0"/>
           </a:p>
@@ -29750,16 +29766,14 @@
       </p:grpSpPr>
       <p:pic>
         <p:nvPicPr>
-          <p:cNvPr id="9" name="Picture 8" descr="GreenProfile.jpg">
-            <a:hlinkClick r:id="rId2"/>
-          </p:cNvPr>
+          <p:cNvPr id="2" name="Picture 1" descr="1048826_10152915377445134_972776573_o.jpg"/>
           <p:cNvPicPr>
             <a:picLocks noChangeAspect="1"/>
           </p:cNvPicPr>
           <p:nvPr/>
         </p:nvPicPr>
         <p:blipFill>
-          <a:blip r:embed="rId3">
+          <a:blip r:embed="rId2">
             <a:extLst>
               <a:ext uri="{28A0092B-C50C-407E-A947-70E740481C1C}">
                 <a14:useLocalDpi xmlns:a14="http://schemas.microsoft.com/office/drawing/2010/main" val="0"/>
@@ -29772,8 +29786,8 @@
         </p:blipFill>
         <p:spPr>
           <a:xfrm>
-            <a:off x="259174" y="920548"/>
-            <a:ext cx="2008412" cy="2008412"/>
+            <a:off x="235977" y="924480"/>
+            <a:ext cx="2033843" cy="2021760"/>
           </a:xfrm>
           <a:prstGeom prst="rect">
             <a:avLst/>
@@ -29847,12 +29861,20 @@
               <a:buChar char="•"/>
             </a:pPr>
             <a:r>
+              <a:rPr lang="en-US" sz="1000" dirty="0" smtClean="0">
+                <a:solidFill>
+                  <a:srgbClr val="000000"/>
+                </a:solidFill>
+              </a:rPr>
+              <a:t>8.9 years </a:t>
+            </a:r>
+            <a:r>
               <a:rPr lang="en-US" sz="1000" dirty="0">
                 <a:solidFill>
                   <a:srgbClr val="000000"/>
                 </a:solidFill>
               </a:rPr>
-              <a:t>8 years of IT experience in Requirement Gathering, Application </a:t>
+              <a:t>of IT experience in Requirement Gathering, Application </a:t>
             </a:r>
             <a:r>
               <a:rPr lang="en-US" sz="1000" dirty="0" smtClean="0">
@@ -29916,7 +29938,23 @@
                   <a:srgbClr val="000000"/>
                 </a:solidFill>
               </a:rPr>
-              <a:t>Have good knowledge on Accessibility Standards in UI Development. </a:t>
+              <a:t>Have good knowledge on </a:t>
+            </a:r>
+            <a:r>
+              <a:rPr lang="en-US" sz="1000" dirty="0" smtClean="0">
+                <a:solidFill>
+                  <a:srgbClr val="000000"/>
+                </a:solidFill>
+              </a:rPr>
+              <a:t>a11y Standards </a:t>
+            </a:r>
+            <a:r>
+              <a:rPr lang="en-US" sz="1000" dirty="0" smtClean="0">
+                <a:solidFill>
+                  <a:srgbClr val="000000"/>
+                </a:solidFill>
+              </a:rPr>
+              <a:t>in UI Development. </a:t>
             </a:r>
           </a:p>
           <a:p>
@@ -29949,8 +29987,37 @@
                   <a:srgbClr val="000000"/>
                 </a:solidFill>
               </a:rPr>
-              <a:t>HTML5, CSS, JavaScript, Java, JSP, GWT, JSP</a:t>
-            </a:r>
+              <a:t>HTML5, CSS, JavaScript, </a:t>
+            </a:r>
+            <a:r>
+              <a:rPr lang="en-US" sz="1000" dirty="0" smtClean="0">
+                <a:solidFill>
+                  <a:srgbClr val="000000"/>
+                </a:solidFill>
+              </a:rPr>
+              <a:t>Polymer, Java</a:t>
+            </a:r>
+            <a:r>
+              <a:rPr lang="en-US" sz="1000" dirty="0" smtClean="0">
+                <a:solidFill>
+                  <a:srgbClr val="000000"/>
+                </a:solidFill>
+              </a:rPr>
+              <a:t>, JSP, </a:t>
+            </a:r>
+            <a:r>
+              <a:rPr lang="en-US" sz="1000" dirty="0" smtClean="0">
+                <a:solidFill>
+                  <a:srgbClr val="000000"/>
+                </a:solidFill>
+              </a:rPr>
+              <a:t>GWT </a:t>
+            </a:r>
+            <a:endParaRPr lang="en-US" sz="1000" dirty="0" smtClean="0">
+              <a:solidFill>
+                <a:srgbClr val="000000"/>
+              </a:solidFill>
+            </a:endParaRPr>
           </a:p>
           <a:p>
             <a:pPr marL="171450" indent="-171450">
@@ -29982,7 +30049,7 @@
                   <a:srgbClr val="262626"/>
                 </a:solidFill>
                 <a:cs typeface="Arial"/>
-                <a:hlinkClick r:id="rId2"/>
+                <a:hlinkClick r:id="rId3"/>
               </a:rPr>
               <a:t>Read More…</a:t>
             </a:r>
@@ -31167,16 +31234,16 @@
                 </a:solidFill>
                 <a:cs typeface="Arial"/>
               </a:rPr>
-              <a:t>Graphics, Accessibility </a:t>
-            </a:r>
-            <a:r>
-              <a:rPr lang="en-GB" sz="1000" dirty="0">
+              <a:t>Graphics, </a:t>
+            </a:r>
+            <a:r>
+              <a:rPr lang="en-GB" sz="1000" dirty="0" smtClean="0">
                 <a:solidFill>
                   <a:srgbClr val="262626"/>
                 </a:solidFill>
                 <a:cs typeface="Arial"/>
               </a:rPr>
-              <a:t>Standards</a:t>
+              <a:t>a11y Standards</a:t>
             </a:r>
             <a:r>
               <a:rPr lang="en-GB" sz="1000" dirty="0">
@@ -31337,7 +31404,7 @@
   <p:timing>
     <p:tnLst>
       <p:par>
-        <p:cTn xmlns:p14="http://schemas.microsoft.com/office/powerpoint/2010/main" id="1" dur="indefinite" restart="never" nodeType="tmRoot"/>
+        <p:cTn id="1" dur="indefinite" restart="never" nodeType="tmRoot"/>
       </p:par>
     </p:tnLst>
   </p:timing>

</xml_diff>

<commit_message>
Mar-2018 Updates. Resume & Brag Updates
</commit_message>
<xml_diff>
--- a/docs/Thiruppathi_Muthukumar.pptx
+++ b/docs/Thiruppathi_Muthukumar.pptx
@@ -19185,7 +19185,7 @@
           <a:p>
             <a:fld id="{9A65DDBD-D2F9-422F-88EF-B46BBBA31C54}" type="datetimeFigureOut">
               <a:rPr lang="en-GB" smtClean="0"/>
-              <a:t>15/06/2016</a:t>
+              <a:t>21/03/2018</a:t>
             </a:fld>
             <a:endParaRPr lang="en-GB" dirty="0"/>
           </a:p>
@@ -19355,7 +19355,7 @@
           <a:p>
             <a:fld id="{9A65DDBD-D2F9-422F-88EF-B46BBBA31C54}" type="datetimeFigureOut">
               <a:rPr lang="en-GB" smtClean="0"/>
-              <a:t>15/06/2016</a:t>
+              <a:t>21/03/2018</a:t>
             </a:fld>
             <a:endParaRPr lang="en-GB" dirty="0"/>
           </a:p>
@@ -19601,7 +19601,7 @@
           <a:p>
             <a:fld id="{9A65DDBD-D2F9-422F-88EF-B46BBBA31C54}" type="datetimeFigureOut">
               <a:rPr lang="en-GB" smtClean="0"/>
-              <a:t>15/06/2016</a:t>
+              <a:t>21/03/2018</a:t>
             </a:fld>
             <a:endParaRPr lang="en-GB" dirty="0"/>
           </a:p>
@@ -19889,7 +19889,7 @@
           <a:p>
             <a:fld id="{9A65DDBD-D2F9-422F-88EF-B46BBBA31C54}" type="datetimeFigureOut">
               <a:rPr lang="en-GB" smtClean="0"/>
-              <a:t>15/06/2016</a:t>
+              <a:t>21/03/2018</a:t>
             </a:fld>
             <a:endParaRPr lang="en-GB" dirty="0"/>
           </a:p>
@@ -20311,7 +20311,7 @@
           <a:p>
             <a:fld id="{9A65DDBD-D2F9-422F-88EF-B46BBBA31C54}" type="datetimeFigureOut">
               <a:rPr lang="en-GB" smtClean="0"/>
-              <a:t>15/06/2016</a:t>
+              <a:t>21/03/2018</a:t>
             </a:fld>
             <a:endParaRPr lang="en-GB" dirty="0"/>
           </a:p>
@@ -20429,7 +20429,7 @@
           <a:p>
             <a:fld id="{9A65DDBD-D2F9-422F-88EF-B46BBBA31C54}" type="datetimeFigureOut">
               <a:rPr lang="en-GB" smtClean="0"/>
-              <a:t>15/06/2016</a:t>
+              <a:t>21/03/2018</a:t>
             </a:fld>
             <a:endParaRPr lang="en-GB" dirty="0"/>
           </a:p>
@@ -20524,7 +20524,7 @@
           <a:p>
             <a:fld id="{9A65DDBD-D2F9-422F-88EF-B46BBBA31C54}" type="datetimeFigureOut">
               <a:rPr lang="en-GB" smtClean="0"/>
-              <a:t>15/06/2016</a:t>
+              <a:t>21/03/2018</a:t>
             </a:fld>
             <a:endParaRPr lang="en-GB" dirty="0"/>
           </a:p>
@@ -20801,7 +20801,7 @@
           <a:p>
             <a:fld id="{9A65DDBD-D2F9-422F-88EF-B46BBBA31C54}" type="datetimeFigureOut">
               <a:rPr lang="en-GB" smtClean="0"/>
-              <a:t>15/06/2016</a:t>
+              <a:t>21/03/2018</a:t>
             </a:fld>
             <a:endParaRPr lang="en-GB" dirty="0"/>
           </a:p>
@@ -21921,7 +21921,7 @@
           <a:p>
             <a:fld id="{9A65DDBD-D2F9-422F-88EF-B46BBBA31C54}" type="datetimeFigureOut">
               <a:rPr lang="en-GB" smtClean="0"/>
-              <a:t>15/06/2016</a:t>
+              <a:t>21/03/2018</a:t>
             </a:fld>
             <a:endParaRPr lang="en-GB" dirty="0"/>
           </a:p>
@@ -22091,7 +22091,7 @@
           <a:p>
             <a:fld id="{9A65DDBD-D2F9-422F-88EF-B46BBBA31C54}" type="datetimeFigureOut">
               <a:rPr lang="en-GB" smtClean="0"/>
-              <a:t>15/06/2016</a:t>
+              <a:t>21/03/2018</a:t>
             </a:fld>
             <a:endParaRPr lang="en-GB" dirty="0"/>
           </a:p>
@@ -22271,7 +22271,7 @@
           <a:p>
             <a:fld id="{9A65DDBD-D2F9-422F-88EF-B46BBBA31C54}" type="datetimeFigureOut">
               <a:rPr lang="en-GB" smtClean="0"/>
-              <a:t>15/06/2016</a:t>
+              <a:t>21/03/2018</a:t>
             </a:fld>
             <a:endParaRPr lang="en-GB" dirty="0"/>
           </a:p>
@@ -29389,7 +29389,7 @@
           <a:p>
             <a:fld id="{9A65DDBD-D2F9-422F-88EF-B46BBBA31C54}" type="datetimeFigureOut">
               <a:rPr lang="en-GB" smtClean="0"/>
-              <a:t>15/06/2016</a:t>
+              <a:t>21/03/2018</a:t>
             </a:fld>
             <a:endParaRPr lang="en-GB" dirty="0"/>
           </a:p>
@@ -29812,10 +29812,18 @@
           <a:lstStyle/>
           <a:p>
             <a:r>
-              <a:rPr lang="en-GB" dirty="0" smtClean="0"/>
+              <a:rPr lang="en-GB" dirty="0" smtClean="0">
+                <a:latin typeface="Calibri" charset="0"/>
+                <a:ea typeface="Calibri" charset="0"/>
+                <a:cs typeface="Calibri" charset="0"/>
+              </a:rPr>
               <a:t>Thiruppathi Muthukumar - Web Developer</a:t>
             </a:r>
-            <a:endParaRPr lang="en-GB" dirty="0"/>
+            <a:endParaRPr lang="en-GB" dirty="0">
+              <a:latin typeface="Calibri" charset="0"/>
+              <a:ea typeface="Calibri" charset="0"/>
+              <a:cs typeface="Calibri" charset="0"/>
+            </a:endParaRPr>
           </a:p>
         </p:txBody>
       </p:sp>
@@ -29865,14 +29873,42 @@
                 <a:solidFill>
                   <a:srgbClr val="000000"/>
                 </a:solidFill>
+                <a:latin typeface="Calibri" charset="0"/>
+                <a:ea typeface="Calibri" charset="0"/>
+                <a:cs typeface="Calibri" charset="0"/>
               </a:rPr>
-              <a:t>8.9 years </a:t>
+              <a:t>10</a:t>
+            </a:r>
+            <a:r>
+              <a:rPr lang="en-US" sz="1000" dirty="0" smtClean="0">
+                <a:solidFill>
+                  <a:srgbClr val="000000"/>
+                </a:solidFill>
+                <a:latin typeface="Calibri" charset="0"/>
+                <a:ea typeface="Calibri" charset="0"/>
+                <a:cs typeface="Calibri" charset="0"/>
+              </a:rPr>
+              <a:t>.9 </a:t>
+            </a:r>
+            <a:r>
+              <a:rPr lang="en-US" sz="1000" dirty="0" smtClean="0">
+                <a:solidFill>
+                  <a:srgbClr val="000000"/>
+                </a:solidFill>
+                <a:latin typeface="Calibri" charset="0"/>
+                <a:ea typeface="Calibri" charset="0"/>
+                <a:cs typeface="Calibri" charset="0"/>
+              </a:rPr>
+              <a:t>years </a:t>
             </a:r>
             <a:r>
               <a:rPr lang="en-US" sz="1000" dirty="0">
                 <a:solidFill>
                   <a:srgbClr val="000000"/>
                 </a:solidFill>
+                <a:latin typeface="Calibri" charset="0"/>
+                <a:ea typeface="Calibri" charset="0"/>
+                <a:cs typeface="Calibri" charset="0"/>
               </a:rPr>
               <a:t>of IT experience in Requirement Gathering, Application </a:t>
             </a:r>
@@ -29881,6 +29917,9 @@
                 <a:solidFill>
                   <a:srgbClr val="000000"/>
                 </a:solidFill>
+                <a:latin typeface="Calibri" charset="0"/>
+                <a:ea typeface="Calibri" charset="0"/>
+                <a:cs typeface="Calibri" charset="0"/>
               </a:rPr>
               <a:t>Development, Maintenance &amp; Testing.</a:t>
             </a:r>
@@ -29898,6 +29937,9 @@
                 <a:solidFill>
                   <a:srgbClr val="000000"/>
                 </a:solidFill>
+                <a:latin typeface="Calibri" charset="0"/>
+                <a:ea typeface="Calibri" charset="0"/>
+                <a:cs typeface="Calibri" charset="0"/>
               </a:rPr>
               <a:t>Good Experience in designing for the web, and specialize in the areas of UI Design &amp; Development, Interaction Design, Visual Design and Prototyping.</a:t>
             </a:r>
@@ -29905,6 +29947,9 @@
               <a:solidFill>
                 <a:srgbClr val="000000"/>
               </a:solidFill>
+              <a:latin typeface="Calibri" charset="0"/>
+              <a:ea typeface="Calibri" charset="0"/>
+              <a:cs typeface="Calibri" charset="0"/>
             </a:endParaRPr>
           </a:p>
           <a:p>
@@ -29920,6 +29965,9 @@
                 <a:solidFill>
                   <a:srgbClr val="000000"/>
                 </a:solidFill>
+                <a:latin typeface="Calibri" charset="0"/>
+                <a:ea typeface="Calibri" charset="0"/>
+                <a:cs typeface="Calibri" charset="0"/>
               </a:rPr>
               <a:t>Experience in Functional, Reactive &amp; Object Oriented Programming.</a:t>
             </a:r>
@@ -29937,6 +29985,9 @@
                 <a:solidFill>
                   <a:srgbClr val="000000"/>
                 </a:solidFill>
+                <a:latin typeface="Calibri" charset="0"/>
+                <a:ea typeface="Calibri" charset="0"/>
+                <a:cs typeface="Calibri" charset="0"/>
               </a:rPr>
               <a:t>Have good knowledge on a11y Standards in UI Development. </a:t>
             </a:r>
@@ -29954,6 +30005,9 @@
                 <a:solidFill>
                   <a:srgbClr val="000000"/>
                 </a:solidFill>
+                <a:latin typeface="Calibri" charset="0"/>
+                <a:ea typeface="Calibri" charset="0"/>
+                <a:cs typeface="Calibri" charset="0"/>
               </a:rPr>
               <a:t>Have experience </a:t>
             </a:r>
@@ -29962,6 +30016,9 @@
                 <a:solidFill>
                   <a:srgbClr val="000000"/>
                 </a:solidFill>
+                <a:latin typeface="Calibri" charset="0"/>
+                <a:ea typeface="Calibri" charset="0"/>
+                <a:cs typeface="Calibri" charset="0"/>
               </a:rPr>
               <a:t>in </a:t>
             </a:r>
@@ -29970,6 +30027,9 @@
                 <a:solidFill>
                   <a:srgbClr val="000000"/>
                 </a:solidFill>
+                <a:latin typeface="Calibri" charset="0"/>
+                <a:ea typeface="Calibri" charset="0"/>
+                <a:cs typeface="Calibri" charset="0"/>
               </a:rPr>
               <a:t>HTML5, CSS, JavaScript, Polymer, Java, JSP, GWT </a:t>
             </a:r>
@@ -29987,6 +30047,9 @@
                 <a:solidFill>
                   <a:srgbClr val="000000"/>
                 </a:solidFill>
+                <a:latin typeface="Calibri" charset="0"/>
+                <a:ea typeface="Calibri" charset="0"/>
+                <a:cs typeface="Calibri" charset="0"/>
               </a:rPr>
               <a:t>Enthusiastic learner who quickly grasps new concepts and technical skills</a:t>
             </a:r>
@@ -29995,6 +30058,9 @@
                 <a:solidFill>
                   <a:srgbClr val="000000"/>
                 </a:solidFill>
+                <a:latin typeface="Calibri" charset="0"/>
+                <a:ea typeface="Calibri" charset="0"/>
+                <a:cs typeface="Calibri" charset="0"/>
               </a:rPr>
               <a:t>. </a:t>
             </a:r>
@@ -30003,7 +30069,9 @@
                 <a:solidFill>
                   <a:srgbClr val="262626"/>
                 </a:solidFill>
-                <a:cs typeface="Arial"/>
+                <a:latin typeface="Calibri" charset="0"/>
+                <a:ea typeface="Calibri" charset="0"/>
+                <a:cs typeface="Calibri" charset="0"/>
                 <a:hlinkClick r:id="rId3"/>
               </a:rPr>
               <a:t>Read More…</a:t>
@@ -30012,6 +30080,9 @@
               <a:solidFill>
                 <a:schemeClr val="tx1"/>
               </a:solidFill>
+              <a:latin typeface="Calibri" charset="0"/>
+              <a:ea typeface="Calibri" charset="0"/>
+              <a:cs typeface="Calibri" charset="0"/>
             </a:endParaRPr>
           </a:p>
         </p:txBody>
@@ -30061,7 +30132,9 @@
                 <a:solidFill>
                   <a:srgbClr val="FFFFFF"/>
                 </a:solidFill>
-                <a:cs typeface="Arial" pitchFamily="34" charset="0"/>
+                <a:latin typeface="Calibri" charset="0"/>
+                <a:ea typeface="Calibri" charset="0"/>
+                <a:cs typeface="Calibri" charset="0"/>
               </a:rPr>
               <a:t>Profile</a:t>
             </a:r>
@@ -30069,8 +30142,9 @@
               <a:solidFill>
                 <a:srgbClr val="FFFFFF"/>
               </a:solidFill>
-              <a:latin typeface="Arial" pitchFamily="34" charset="0"/>
-              <a:cs typeface="Arial" pitchFamily="34" charset="0"/>
+              <a:latin typeface="Calibri" charset="0"/>
+              <a:ea typeface="Calibri" charset="0"/>
+              <a:cs typeface="Calibri" charset="0"/>
             </a:endParaRPr>
           </a:p>
         </p:txBody>
@@ -30120,8 +30194,9 @@
                 <a:solidFill>
                   <a:srgbClr val="FFFFFF"/>
                 </a:solidFill>
-                <a:latin typeface="Arial" pitchFamily="34" charset="0"/>
-                <a:cs typeface="Arial" pitchFamily="34" charset="0"/>
+                <a:latin typeface="Calibri" charset="0"/>
+                <a:ea typeface="Calibri" charset="0"/>
+                <a:cs typeface="Calibri" charset="0"/>
               </a:rPr>
               <a:t>Projects &amp; Assignments (extract)</a:t>
             </a:r>
@@ -30129,8 +30204,9 @@
               <a:solidFill>
                 <a:srgbClr val="FFFFFF"/>
               </a:solidFill>
-              <a:latin typeface="Arial" pitchFamily="34" charset="0"/>
-              <a:cs typeface="Arial" pitchFamily="34" charset="0"/>
+              <a:latin typeface="Calibri" charset="0"/>
+              <a:ea typeface="Calibri" charset="0"/>
+              <a:cs typeface="Calibri" charset="0"/>
             </a:endParaRPr>
           </a:p>
         </p:txBody>
@@ -30174,6 +30250,9 @@
                 <a:solidFill>
                   <a:schemeClr val="tx1"/>
                 </a:solidFill>
+                <a:latin typeface="Calibri" charset="0"/>
+                <a:ea typeface="Calibri" charset="0"/>
+                <a:cs typeface="Calibri" charset="0"/>
               </a:rPr>
               <a:t>Web Developer – </a:t>
             </a:r>
@@ -30182,6 +30261,9 @@
                 <a:solidFill>
                   <a:schemeClr val="tx1"/>
                 </a:solidFill>
+                <a:latin typeface="Calibri" charset="0"/>
+                <a:ea typeface="Calibri" charset="0"/>
+                <a:cs typeface="Calibri" charset="0"/>
                 <a:hlinkClick r:id="rId4"/>
               </a:rPr>
               <a:t>Everything Everywhere (EE</a:t>
@@ -30191,6 +30273,9 @@
                 <a:solidFill>
                   <a:schemeClr val="tx1"/>
                 </a:solidFill>
+                <a:latin typeface="Calibri" charset="0"/>
+                <a:ea typeface="Calibri" charset="0"/>
+                <a:cs typeface="Calibri" charset="0"/>
                 <a:hlinkClick r:id="rId4"/>
               </a:rPr>
               <a:t>)</a:t>
@@ -30200,6 +30285,9 @@
                 <a:solidFill>
                   <a:schemeClr val="tx1"/>
                 </a:solidFill>
+                <a:latin typeface="Calibri" charset="0"/>
+                <a:ea typeface="Calibri" charset="0"/>
+                <a:cs typeface="Calibri" charset="0"/>
               </a:rPr>
               <a:t> - </a:t>
             </a:r>
@@ -30208,6 +30296,9 @@
                 <a:solidFill>
                   <a:schemeClr val="tx1"/>
                 </a:solidFill>
+                <a:latin typeface="Calibri" charset="0"/>
+                <a:ea typeface="Calibri" charset="0"/>
+                <a:cs typeface="Calibri" charset="0"/>
               </a:rPr>
               <a:t>Oct </a:t>
             </a:r>
@@ -30216,6 +30307,9 @@
                 <a:solidFill>
                   <a:schemeClr val="tx1"/>
                 </a:solidFill>
+                <a:latin typeface="Calibri" charset="0"/>
+                <a:ea typeface="Calibri" charset="0"/>
+                <a:cs typeface="Calibri" charset="0"/>
               </a:rPr>
               <a:t>2014 </a:t>
             </a:r>
@@ -30224,6 +30318,9 @@
                 <a:solidFill>
                   <a:schemeClr val="tx1"/>
                 </a:solidFill>
+                <a:latin typeface="Calibri" charset="0"/>
+                <a:ea typeface="Calibri" charset="0"/>
+                <a:cs typeface="Calibri" charset="0"/>
               </a:rPr>
               <a:t>– </a:t>
             </a:r>
@@ -30232,6 +30329,9 @@
                 <a:solidFill>
                   <a:schemeClr val="tx1"/>
                 </a:solidFill>
+                <a:latin typeface="Calibri" charset="0"/>
+                <a:ea typeface="Calibri" charset="0"/>
+                <a:cs typeface="Calibri" charset="0"/>
               </a:rPr>
               <a:t>Present</a:t>
             </a:r>
@@ -30239,6 +30339,9 @@
               <a:solidFill>
                 <a:schemeClr val="tx1"/>
               </a:solidFill>
+              <a:latin typeface="Calibri" charset="0"/>
+              <a:ea typeface="Calibri" charset="0"/>
+              <a:cs typeface="Calibri" charset="0"/>
             </a:endParaRPr>
           </a:p>
           <a:p>
@@ -30247,6 +30350,9 @@
                 <a:solidFill>
                   <a:schemeClr val="tx1"/>
                 </a:solidFill>
+                <a:latin typeface="Calibri" charset="0"/>
+                <a:ea typeface="Calibri" charset="0"/>
+                <a:cs typeface="Calibri" charset="0"/>
               </a:rPr>
               <a:t>Developed modular, responsive UI Components using JSP, JSTL, CSS3, </a:t>
             </a:r>
@@ -30255,6 +30361,9 @@
                 <a:solidFill>
                   <a:schemeClr val="tx1"/>
                 </a:solidFill>
+                <a:latin typeface="Calibri" charset="0"/>
+                <a:ea typeface="Calibri" charset="0"/>
+                <a:cs typeface="Calibri" charset="0"/>
               </a:rPr>
               <a:t>jQuery</a:t>
             </a:r>
@@ -30263,6 +30372,9 @@
                 <a:solidFill>
                   <a:schemeClr val="tx1"/>
                 </a:solidFill>
+                <a:latin typeface="Calibri" charset="0"/>
+                <a:ea typeface="Calibri" charset="0"/>
+                <a:cs typeface="Calibri" charset="0"/>
               </a:rPr>
               <a:t>, Media </a:t>
             </a:r>
@@ -30271,6 +30383,9 @@
                 <a:solidFill>
                   <a:schemeClr val="tx1"/>
                 </a:solidFill>
+                <a:latin typeface="Calibri" charset="0"/>
+                <a:ea typeface="Calibri" charset="0"/>
+                <a:cs typeface="Calibri" charset="0"/>
               </a:rPr>
               <a:t>Queires</a:t>
             </a:r>
@@ -30279,6 +30394,9 @@
                 <a:solidFill>
                   <a:schemeClr val="tx1"/>
                 </a:solidFill>
+                <a:latin typeface="Calibri" charset="0"/>
+                <a:ea typeface="Calibri" charset="0"/>
+                <a:cs typeface="Calibri" charset="0"/>
               </a:rPr>
               <a:t>, </a:t>
             </a:r>
@@ -30287,6 +30405,9 @@
                 <a:solidFill>
                   <a:schemeClr val="tx1"/>
                 </a:solidFill>
+                <a:latin typeface="Calibri" charset="0"/>
+                <a:ea typeface="Calibri" charset="0"/>
+                <a:cs typeface="Calibri" charset="0"/>
               </a:rPr>
               <a:t>Raphaël</a:t>
             </a:r>
@@ -30295,11 +30416,17 @@
                 <a:solidFill>
                   <a:schemeClr val="tx1"/>
                 </a:solidFill>
+                <a:latin typeface="Calibri" charset="0"/>
+                <a:ea typeface="Calibri" charset="0"/>
+                <a:cs typeface="Calibri" charset="0"/>
               </a:rPr>
               <a:t> JS for various flows of </a:t>
             </a:r>
             <a:r>
               <a:rPr lang="en-US" sz="1000" u="sng" dirty="0" smtClean="0">
+                <a:latin typeface="Calibri" charset="0"/>
+                <a:ea typeface="Calibri" charset="0"/>
+                <a:cs typeface="Calibri" charset="0"/>
                 <a:hlinkClick r:id="rId5"/>
               </a:rPr>
               <a:t>My Account</a:t>
@@ -30309,6 +30436,9 @@
                 <a:solidFill>
                   <a:srgbClr val="000000"/>
                 </a:solidFill>
+                <a:latin typeface="Calibri" charset="0"/>
+                <a:ea typeface="Calibri" charset="0"/>
+                <a:cs typeface="Calibri" charset="0"/>
               </a:rPr>
               <a:t>.</a:t>
             </a:r>
@@ -30316,6 +30446,9 @@
               <a:solidFill>
                 <a:srgbClr val="000000"/>
               </a:solidFill>
+              <a:latin typeface="Calibri" charset="0"/>
+              <a:ea typeface="Calibri" charset="0"/>
+              <a:cs typeface="Calibri" charset="0"/>
             </a:endParaRPr>
           </a:p>
           <a:p>
@@ -30325,6 +30458,9 @@
                 <a:solidFill>
                   <a:schemeClr val="tx1"/>
                 </a:solidFill>
+                <a:latin typeface="Calibri" charset="0"/>
+                <a:ea typeface="Calibri" charset="0"/>
+                <a:cs typeface="Calibri" charset="0"/>
               </a:rPr>
               <a:t>Integrated </a:t>
             </a:r>
@@ -30333,6 +30469,9 @@
                 <a:solidFill>
                   <a:schemeClr val="tx1"/>
                 </a:solidFill>
+                <a:latin typeface="Calibri" charset="0"/>
+                <a:ea typeface="Calibri" charset="0"/>
+                <a:cs typeface="Calibri" charset="0"/>
               </a:rPr>
               <a:t>JSP pages with the AEM &amp; </a:t>
             </a:r>
@@ -30341,6 +30480,9 @@
                 <a:solidFill>
                   <a:schemeClr val="tx1"/>
                 </a:solidFill>
+                <a:latin typeface="Calibri" charset="0"/>
+                <a:ea typeface="Calibri" charset="0"/>
+                <a:cs typeface="Calibri" charset="0"/>
               </a:rPr>
               <a:t>Backend. Developed </a:t>
             </a:r>
@@ -30349,6 +30491,9 @@
                 <a:solidFill>
                   <a:schemeClr val="tx1"/>
                 </a:solidFill>
+                <a:latin typeface="Calibri" charset="0"/>
+                <a:ea typeface="Calibri" charset="0"/>
+                <a:cs typeface="Calibri" charset="0"/>
               </a:rPr>
               <a:t>proof of concepts using Polymer, </a:t>
             </a:r>
@@ -30357,6 +30502,9 @@
                 <a:solidFill>
                   <a:schemeClr val="tx1"/>
                 </a:solidFill>
+                <a:latin typeface="Calibri" charset="0"/>
+                <a:ea typeface="Calibri" charset="0"/>
+                <a:cs typeface="Calibri" charset="0"/>
               </a:rPr>
               <a:t>React-JS </a:t>
             </a:r>
@@ -30365,6 +30513,9 @@
                 <a:solidFill>
                   <a:schemeClr val="tx1"/>
                 </a:solidFill>
+                <a:latin typeface="Calibri" charset="0"/>
+                <a:ea typeface="Calibri" charset="0"/>
+                <a:cs typeface="Calibri" charset="0"/>
               </a:rPr>
               <a:t>to upgrade the current system</a:t>
             </a:r>
@@ -30373,6 +30524,9 @@
                 <a:solidFill>
                   <a:schemeClr val="tx1"/>
                 </a:solidFill>
+                <a:latin typeface="Calibri" charset="0"/>
+                <a:ea typeface="Calibri" charset="0"/>
+                <a:cs typeface="Calibri" charset="0"/>
               </a:rPr>
               <a:t>.</a:t>
             </a:r>
@@ -30384,6 +30538,9 @@
                 <a:solidFill>
                   <a:schemeClr val="tx1"/>
                 </a:solidFill>
+                <a:latin typeface="Calibri" charset="0"/>
+                <a:ea typeface="Calibri" charset="0"/>
+                <a:cs typeface="Calibri" charset="0"/>
               </a:rPr>
               <a:t> </a:t>
             </a:r>
@@ -30391,6 +30548,9 @@
               <a:solidFill>
                 <a:schemeClr val="tx1"/>
               </a:solidFill>
+              <a:latin typeface="Calibri" charset="0"/>
+              <a:ea typeface="Calibri" charset="0"/>
+              <a:cs typeface="Calibri" charset="0"/>
             </a:endParaRPr>
           </a:p>
           <a:p>
@@ -30399,6 +30559,9 @@
                 <a:solidFill>
                   <a:schemeClr val="tx1"/>
                 </a:solidFill>
+                <a:latin typeface="Calibri" charset="0"/>
+                <a:ea typeface="Calibri" charset="0"/>
+                <a:cs typeface="Calibri" charset="0"/>
               </a:rPr>
               <a:t>UI Developer – </a:t>
             </a:r>
@@ -30407,6 +30570,9 @@
                 <a:solidFill>
                   <a:schemeClr val="tx1"/>
                 </a:solidFill>
+                <a:latin typeface="Calibri" charset="0"/>
+                <a:ea typeface="Calibri" charset="0"/>
+                <a:cs typeface="Calibri" charset="0"/>
                 <a:hlinkClick r:id="rId6"/>
               </a:rPr>
               <a:t>Unisys</a:t>
@@ -30416,6 +30582,9 @@
                 <a:solidFill>
                   <a:schemeClr val="tx1"/>
                 </a:solidFill>
+                <a:latin typeface="Calibri" charset="0"/>
+                <a:ea typeface="Calibri" charset="0"/>
+                <a:cs typeface="Calibri" charset="0"/>
               </a:rPr>
               <a:t>  - April </a:t>
             </a:r>
@@ -30424,6 +30593,9 @@
                 <a:solidFill>
                   <a:schemeClr val="tx1"/>
                 </a:solidFill>
+                <a:latin typeface="Calibri" charset="0"/>
+                <a:ea typeface="Calibri" charset="0"/>
+                <a:cs typeface="Calibri" charset="0"/>
               </a:rPr>
               <a:t>2014 – Sep 2014</a:t>
             </a:r>
@@ -30431,6 +30603,9 @@
               <a:solidFill>
                 <a:schemeClr val="tx1"/>
               </a:solidFill>
+              <a:latin typeface="Calibri" charset="0"/>
+              <a:ea typeface="Calibri" charset="0"/>
+              <a:cs typeface="Calibri" charset="0"/>
             </a:endParaRPr>
           </a:p>
           <a:p>
@@ -30440,6 +30615,9 @@
                 <a:solidFill>
                   <a:schemeClr val="tx1"/>
                 </a:solidFill>
+                <a:latin typeface="Calibri" charset="0"/>
+                <a:ea typeface="Calibri" charset="0"/>
+                <a:cs typeface="Calibri" charset="0"/>
               </a:rPr>
               <a:t>Contributed </a:t>
             </a:r>
@@ -30448,6 +30626,9 @@
                 <a:solidFill>
                   <a:schemeClr val="tx1"/>
                 </a:solidFill>
+                <a:latin typeface="Calibri" charset="0"/>
+                <a:ea typeface="Calibri" charset="0"/>
+                <a:cs typeface="Calibri" charset="0"/>
               </a:rPr>
               <a:t>to Visual Design &amp; Prototype for the LEIDA 3.0</a:t>
             </a:r>
@@ -30456,6 +30637,9 @@
                 <a:solidFill>
                   <a:schemeClr val="tx1"/>
                 </a:solidFill>
+                <a:latin typeface="Calibri" charset="0"/>
+                <a:ea typeface="Calibri" charset="0"/>
+                <a:cs typeface="Calibri" charset="0"/>
               </a:rPr>
               <a:t>. Developed </a:t>
             </a:r>
@@ -30464,6 +30648,9 @@
                 <a:solidFill>
                   <a:schemeClr val="tx1"/>
                 </a:solidFill>
+                <a:latin typeface="Calibri" charset="0"/>
+                <a:ea typeface="Calibri" charset="0"/>
+                <a:cs typeface="Calibri" charset="0"/>
               </a:rPr>
               <a:t>Pages using ZK, HTML 5, CSS 3 &amp; </a:t>
             </a:r>
@@ -30472,6 +30659,9 @@
                 <a:solidFill>
                   <a:schemeClr val="tx1"/>
                 </a:solidFill>
+                <a:latin typeface="Calibri" charset="0"/>
+                <a:ea typeface="Calibri" charset="0"/>
+                <a:cs typeface="Calibri" charset="0"/>
               </a:rPr>
               <a:t>JQuery</a:t>
             </a:r>
@@ -30480,6 +30670,9 @@
                 <a:solidFill>
                   <a:schemeClr val="tx1"/>
                 </a:solidFill>
+                <a:latin typeface="Calibri" charset="0"/>
+                <a:ea typeface="Calibri" charset="0"/>
+                <a:cs typeface="Calibri" charset="0"/>
               </a:rPr>
               <a:t>. Created </a:t>
             </a:r>
@@ -30488,6 +30681,9 @@
                 <a:solidFill>
                   <a:schemeClr val="tx1"/>
                 </a:solidFill>
+                <a:latin typeface="Calibri" charset="0"/>
+                <a:ea typeface="Calibri" charset="0"/>
+                <a:cs typeface="Calibri" charset="0"/>
               </a:rPr>
               <a:t>new Icons; Integrated prototypes with the front-end framework </a:t>
             </a:r>
@@ -30496,6 +30692,9 @@
                 <a:solidFill>
                   <a:schemeClr val="tx1"/>
                 </a:solidFill>
+                <a:latin typeface="Calibri" charset="0"/>
+                <a:ea typeface="Calibri" charset="0"/>
+                <a:cs typeface="Calibri" charset="0"/>
               </a:rPr>
               <a:t>ZK. Fixed </a:t>
             </a:r>
@@ -30504,6 +30703,9 @@
                 <a:solidFill>
                   <a:schemeClr val="tx1"/>
                 </a:solidFill>
+                <a:latin typeface="Calibri" charset="0"/>
+                <a:ea typeface="Calibri" charset="0"/>
+                <a:cs typeface="Calibri" charset="0"/>
               </a:rPr>
               <a:t>FOUC bugs on ZUL pages &amp; Improved page performance by optimising the code</a:t>
             </a:r>
@@ -30512,6 +30714,9 @@
                 <a:solidFill>
                   <a:schemeClr val="tx1"/>
                 </a:solidFill>
+                <a:latin typeface="Calibri" charset="0"/>
+                <a:ea typeface="Calibri" charset="0"/>
+                <a:cs typeface="Calibri" charset="0"/>
               </a:rPr>
               <a:t>. Created Visual Design &amp; Prototype for CCHRI system. Developed Pages using HTML 5, CSS 3 &amp; </a:t>
             </a:r>
@@ -30520,6 +30725,9 @@
                 <a:solidFill>
                   <a:schemeClr val="tx1"/>
                 </a:solidFill>
+                <a:latin typeface="Calibri" charset="0"/>
+                <a:ea typeface="Calibri" charset="0"/>
+                <a:cs typeface="Calibri" charset="0"/>
               </a:rPr>
               <a:t>JQuery</a:t>
             </a:r>
@@ -30527,6 +30735,9 @@
               <a:solidFill>
                 <a:schemeClr val="tx1"/>
               </a:solidFill>
+              <a:latin typeface="Calibri" charset="0"/>
+              <a:ea typeface="Calibri" charset="0"/>
+              <a:cs typeface="Calibri" charset="0"/>
             </a:endParaRPr>
           </a:p>
           <a:p>
@@ -30535,6 +30746,9 @@
                 <a:solidFill>
                   <a:schemeClr val="tx1"/>
                 </a:solidFill>
+                <a:latin typeface="Calibri" charset="0"/>
+                <a:ea typeface="Calibri" charset="0"/>
+                <a:cs typeface="Calibri" charset="0"/>
               </a:rPr>
               <a:t> </a:t>
             </a:r>
@@ -30542,6 +30756,9 @@
               <a:solidFill>
                 <a:schemeClr val="tx1"/>
               </a:solidFill>
+              <a:latin typeface="Calibri" charset="0"/>
+              <a:ea typeface="Calibri" charset="0"/>
+              <a:cs typeface="Calibri" charset="0"/>
             </a:endParaRPr>
           </a:p>
           <a:p>
@@ -30550,6 +30767,9 @@
                 <a:solidFill>
                   <a:schemeClr val="tx1"/>
                 </a:solidFill>
+                <a:latin typeface="Calibri" charset="0"/>
+                <a:ea typeface="Calibri" charset="0"/>
+                <a:cs typeface="Calibri" charset="0"/>
               </a:rPr>
               <a:t>GWT/Java Developer - </a:t>
             </a:r>
@@ -30558,6 +30778,9 @@
                 <a:solidFill>
                   <a:schemeClr val="tx1"/>
                 </a:solidFill>
+                <a:latin typeface="Calibri" charset="0"/>
+                <a:ea typeface="Calibri" charset="0"/>
+                <a:cs typeface="Calibri" charset="0"/>
                 <a:hlinkClick r:id="rId7"/>
               </a:rPr>
               <a:t>Tokio Marine </a:t>
@@ -30567,6 +30790,9 @@
                 <a:solidFill>
                   <a:schemeClr val="tx1"/>
                 </a:solidFill>
+                <a:latin typeface="Calibri" charset="0"/>
+                <a:ea typeface="Calibri" charset="0"/>
+                <a:cs typeface="Calibri" charset="0"/>
                 <a:hlinkClick r:id="rId7"/>
               </a:rPr>
               <a:t>Kiln</a:t>
@@ -30576,6 +30802,9 @@
                 <a:solidFill>
                   <a:schemeClr val="tx1"/>
                 </a:solidFill>
+                <a:latin typeface="Calibri" charset="0"/>
+                <a:ea typeface="Calibri" charset="0"/>
+                <a:cs typeface="Calibri" charset="0"/>
               </a:rPr>
               <a:t> </a:t>
             </a:r>
@@ -30584,6 +30813,9 @@
                 <a:solidFill>
                   <a:schemeClr val="tx1"/>
                 </a:solidFill>
+                <a:latin typeface="Calibri" charset="0"/>
+                <a:ea typeface="Calibri" charset="0"/>
+                <a:cs typeface="Calibri" charset="0"/>
               </a:rPr>
               <a:t> - May </a:t>
             </a:r>
@@ -30592,6 +30824,9 @@
                 <a:solidFill>
                   <a:schemeClr val="tx1"/>
                 </a:solidFill>
+                <a:latin typeface="Calibri" charset="0"/>
+                <a:ea typeface="Calibri" charset="0"/>
+                <a:cs typeface="Calibri" charset="0"/>
               </a:rPr>
               <a:t>2012 – </a:t>
             </a:r>
@@ -30600,6 +30835,9 @@
                 <a:solidFill>
                   <a:schemeClr val="tx1"/>
                 </a:solidFill>
+                <a:latin typeface="Calibri" charset="0"/>
+                <a:ea typeface="Calibri" charset="0"/>
+                <a:cs typeface="Calibri" charset="0"/>
               </a:rPr>
               <a:t>Mar </a:t>
             </a:r>
@@ -30608,6 +30846,9 @@
                 <a:solidFill>
                   <a:schemeClr val="tx1"/>
                 </a:solidFill>
+                <a:latin typeface="Calibri" charset="0"/>
+                <a:ea typeface="Calibri" charset="0"/>
+                <a:cs typeface="Calibri" charset="0"/>
               </a:rPr>
               <a:t>2014 </a:t>
             </a:r>
@@ -30615,6 +30856,9 @@
               <a:solidFill>
                 <a:schemeClr val="tx1"/>
               </a:solidFill>
+              <a:latin typeface="Calibri" charset="0"/>
+              <a:ea typeface="Calibri" charset="0"/>
+              <a:cs typeface="Calibri" charset="0"/>
             </a:endParaRPr>
           </a:p>
           <a:p>
@@ -30624,6 +30868,9 @@
                 <a:solidFill>
                   <a:schemeClr val="tx1"/>
                 </a:solidFill>
+                <a:latin typeface="Calibri" charset="0"/>
+                <a:ea typeface="Calibri" charset="0"/>
+                <a:cs typeface="Calibri" charset="0"/>
               </a:rPr>
               <a:t>Created </a:t>
             </a:r>
@@ -30632,6 +30879,9 @@
                 <a:solidFill>
                   <a:schemeClr val="tx1"/>
                 </a:solidFill>
+                <a:latin typeface="Calibri" charset="0"/>
+                <a:ea typeface="Calibri" charset="0"/>
+                <a:cs typeface="Calibri" charset="0"/>
               </a:rPr>
               <a:t>prototype &amp; Visual Design for the entire CBS suite of </a:t>
             </a:r>
@@ -30640,6 +30890,9 @@
                 <a:solidFill>
                   <a:schemeClr val="tx1"/>
                 </a:solidFill>
+                <a:latin typeface="Calibri" charset="0"/>
+                <a:ea typeface="Calibri" charset="0"/>
+                <a:cs typeface="Calibri" charset="0"/>
               </a:rPr>
               <a:t>products. Developed </a:t>
             </a:r>
@@ -30648,6 +30901,9 @@
                 <a:solidFill>
                   <a:schemeClr val="tx1"/>
                 </a:solidFill>
+                <a:latin typeface="Calibri" charset="0"/>
+                <a:ea typeface="Calibri" charset="0"/>
+                <a:cs typeface="Calibri" charset="0"/>
               </a:rPr>
               <a:t>customised UI widgets using GWT</a:t>
             </a:r>
@@ -30656,6 +30912,9 @@
                 <a:solidFill>
                   <a:schemeClr val="tx1"/>
                 </a:solidFill>
+                <a:latin typeface="Calibri" charset="0"/>
+                <a:ea typeface="Calibri" charset="0"/>
+                <a:cs typeface="Calibri" charset="0"/>
               </a:rPr>
               <a:t>; Developed </a:t>
             </a:r>
@@ -30664,6 +30923,9 @@
                 <a:solidFill>
                   <a:schemeClr val="tx1"/>
                 </a:solidFill>
+                <a:latin typeface="Calibri" charset="0"/>
+                <a:ea typeface="Calibri" charset="0"/>
+                <a:cs typeface="Calibri" charset="0"/>
               </a:rPr>
               <a:t>the User Admin </a:t>
             </a:r>
@@ -30672,6 +30934,9 @@
                 <a:solidFill>
                   <a:schemeClr val="tx1"/>
                 </a:solidFill>
+                <a:latin typeface="Calibri" charset="0"/>
+                <a:ea typeface="Calibri" charset="0"/>
+                <a:cs typeface="Calibri" charset="0"/>
               </a:rPr>
               <a:t>module. Played </a:t>
             </a:r>
@@ -30680,6 +30945,9 @@
                 <a:solidFill>
                   <a:schemeClr val="tx1"/>
                 </a:solidFill>
+                <a:latin typeface="Calibri" charset="0"/>
+                <a:ea typeface="Calibri" charset="0"/>
+                <a:cs typeface="Calibri" charset="0"/>
               </a:rPr>
               <a:t>a major role in developing integration solution between the </a:t>
             </a:r>
@@ -30688,6 +30956,9 @@
                 <a:solidFill>
                   <a:schemeClr val="tx1"/>
                 </a:solidFill>
+                <a:latin typeface="Calibri" charset="0"/>
+                <a:ea typeface="Calibri" charset="0"/>
+                <a:cs typeface="Calibri" charset="0"/>
               </a:rPr>
               <a:t>apps. Automated </a:t>
             </a:r>
@@ -30696,6 +30967,9 @@
                 <a:solidFill>
                   <a:schemeClr val="tx1"/>
                 </a:solidFill>
+                <a:latin typeface="Calibri" charset="0"/>
+                <a:ea typeface="Calibri" charset="0"/>
+                <a:cs typeface="Calibri" charset="0"/>
               </a:rPr>
               <a:t>ActiveMQ</a:t>
             </a:r>
@@ -30704,6 +30978,9 @@
                 <a:solidFill>
                   <a:schemeClr val="tx1"/>
                 </a:solidFill>
+                <a:latin typeface="Calibri" charset="0"/>
+                <a:ea typeface="Calibri" charset="0"/>
+                <a:cs typeface="Calibri" charset="0"/>
               </a:rPr>
               <a:t> Browser installation using </a:t>
             </a:r>
@@ -30712,6 +30989,9 @@
                 <a:solidFill>
                   <a:schemeClr val="tx1"/>
                 </a:solidFill>
+                <a:latin typeface="Calibri" charset="0"/>
+                <a:ea typeface="Calibri" charset="0"/>
+                <a:cs typeface="Calibri" charset="0"/>
               </a:rPr>
               <a:t>PowerShell</a:t>
             </a:r>
@@ -30722,6 +31002,9 @@
               <a:solidFill>
                 <a:schemeClr val="tx1"/>
               </a:solidFill>
+              <a:latin typeface="Calibri" charset="0"/>
+              <a:ea typeface="Calibri" charset="0"/>
+              <a:cs typeface="Calibri" charset="0"/>
             </a:endParaRPr>
           </a:p>
           <a:p>
@@ -30730,6 +31013,9 @@
                 <a:solidFill>
                   <a:schemeClr val="tx1"/>
                 </a:solidFill>
+                <a:latin typeface="Calibri" charset="0"/>
+                <a:ea typeface="Calibri" charset="0"/>
+                <a:cs typeface="Calibri" charset="0"/>
               </a:rPr>
               <a:t>Java Developer - </a:t>
             </a:r>
@@ -30738,6 +31024,9 @@
                 <a:solidFill>
                   <a:schemeClr val="tx1"/>
                 </a:solidFill>
+                <a:latin typeface="Calibri" charset="0"/>
+                <a:ea typeface="Calibri" charset="0"/>
+                <a:cs typeface="Calibri" charset="0"/>
                 <a:hlinkClick r:id="rId7"/>
               </a:rPr>
               <a:t>Tokio Marine </a:t>
@@ -30747,6 +31036,9 @@
                 <a:solidFill>
                   <a:schemeClr val="tx1"/>
                 </a:solidFill>
+                <a:latin typeface="Calibri" charset="0"/>
+                <a:ea typeface="Calibri" charset="0"/>
+                <a:cs typeface="Calibri" charset="0"/>
                 <a:hlinkClick r:id="rId7"/>
               </a:rPr>
               <a:t>Kiln</a:t>
@@ -30756,6 +31048,9 @@
                 <a:solidFill>
                   <a:schemeClr val="tx1"/>
                 </a:solidFill>
+                <a:latin typeface="Calibri" charset="0"/>
+                <a:ea typeface="Calibri" charset="0"/>
+                <a:cs typeface="Calibri" charset="0"/>
               </a:rPr>
               <a:t> </a:t>
             </a:r>
@@ -30764,6 +31059,9 @@
                 <a:solidFill>
                   <a:schemeClr val="tx1"/>
                 </a:solidFill>
+                <a:latin typeface="Calibri" charset="0"/>
+                <a:ea typeface="Calibri" charset="0"/>
+                <a:cs typeface="Calibri" charset="0"/>
               </a:rPr>
               <a:t>-  </a:t>
             </a:r>
@@ -30772,6 +31070,9 @@
                 <a:solidFill>
                   <a:schemeClr val="tx1"/>
                 </a:solidFill>
+                <a:latin typeface="Calibri" charset="0"/>
+                <a:ea typeface="Calibri" charset="0"/>
+                <a:cs typeface="Calibri" charset="0"/>
               </a:rPr>
               <a:t>Dec 2010 – </a:t>
             </a:r>
@@ -30780,6 +31081,9 @@
                 <a:solidFill>
                   <a:schemeClr val="tx1"/>
                 </a:solidFill>
+                <a:latin typeface="Calibri" charset="0"/>
+                <a:ea typeface="Calibri" charset="0"/>
+                <a:cs typeface="Calibri" charset="0"/>
               </a:rPr>
               <a:t>Apr </a:t>
             </a:r>
@@ -30788,6 +31092,9 @@
                 <a:solidFill>
                   <a:schemeClr val="tx1"/>
                 </a:solidFill>
+                <a:latin typeface="Calibri" charset="0"/>
+                <a:ea typeface="Calibri" charset="0"/>
+                <a:cs typeface="Calibri" charset="0"/>
               </a:rPr>
               <a:t>2012 </a:t>
             </a:r>
@@ -30795,6 +31102,9 @@
               <a:solidFill>
                 <a:schemeClr val="tx1"/>
               </a:solidFill>
+              <a:latin typeface="Calibri" charset="0"/>
+              <a:ea typeface="Calibri" charset="0"/>
+              <a:cs typeface="Calibri" charset="0"/>
             </a:endParaRPr>
           </a:p>
           <a:p>
@@ -30804,6 +31114,9 @@
                 <a:solidFill>
                   <a:schemeClr val="tx1"/>
                 </a:solidFill>
+                <a:latin typeface="Calibri" charset="0"/>
+                <a:ea typeface="Calibri" charset="0"/>
+                <a:cs typeface="Calibri" charset="0"/>
               </a:rPr>
               <a:t>Contributed </a:t>
             </a:r>
@@ -30812,6 +31125,9 @@
                 <a:solidFill>
                   <a:schemeClr val="tx1"/>
                 </a:solidFill>
+                <a:latin typeface="Calibri" charset="0"/>
+                <a:ea typeface="Calibri" charset="0"/>
+                <a:cs typeface="Calibri" charset="0"/>
               </a:rPr>
               <a:t>major part in IE6 to IE8 </a:t>
             </a:r>
@@ -30820,6 +31136,9 @@
                 <a:solidFill>
                   <a:schemeClr val="tx1"/>
                 </a:solidFill>
+                <a:latin typeface="Calibri" charset="0"/>
+                <a:ea typeface="Calibri" charset="0"/>
+                <a:cs typeface="Calibri" charset="0"/>
               </a:rPr>
               <a:t>Migration of Forecasting &amp; Binders applications. Created </a:t>
             </a:r>
@@ -30828,6 +31147,9 @@
                 <a:solidFill>
                   <a:schemeClr val="tx1"/>
                 </a:solidFill>
+                <a:latin typeface="Calibri" charset="0"/>
+                <a:ea typeface="Calibri" charset="0"/>
+                <a:cs typeface="Calibri" charset="0"/>
               </a:rPr>
               <a:t>Custom JSTL </a:t>
             </a:r>
@@ -30836,6 +31158,9 @@
                 <a:solidFill>
                   <a:schemeClr val="tx1"/>
                 </a:solidFill>
+                <a:latin typeface="Calibri" charset="0"/>
+                <a:ea typeface="Calibri" charset="0"/>
+                <a:cs typeface="Calibri" charset="0"/>
               </a:rPr>
               <a:t>tags. Automated </a:t>
             </a:r>
@@ -30844,6 +31169,9 @@
                 <a:solidFill>
                   <a:schemeClr val="tx1"/>
                 </a:solidFill>
+                <a:latin typeface="Calibri" charset="0"/>
+                <a:ea typeface="Calibri" charset="0"/>
+                <a:cs typeface="Calibri" charset="0"/>
               </a:rPr>
               <a:t>UI Unit testing through </a:t>
             </a:r>
@@ -30852,6 +31180,9 @@
                 <a:solidFill>
                   <a:schemeClr val="tx1"/>
                 </a:solidFill>
+                <a:latin typeface="Calibri" charset="0"/>
+                <a:ea typeface="Calibri" charset="0"/>
+                <a:cs typeface="Calibri" charset="0"/>
               </a:rPr>
               <a:t>Selenium.</a:t>
             </a:r>
@@ -30859,6 +31190,9 @@
               <a:solidFill>
                 <a:schemeClr val="tx1"/>
               </a:solidFill>
+              <a:latin typeface="Calibri" charset="0"/>
+              <a:ea typeface="Calibri" charset="0"/>
+              <a:cs typeface="Calibri" charset="0"/>
             </a:endParaRPr>
           </a:p>
           <a:p>
@@ -30867,6 +31201,9 @@
                 <a:solidFill>
                   <a:schemeClr val="tx1"/>
                 </a:solidFill>
+                <a:latin typeface="Calibri" charset="0"/>
+                <a:ea typeface="Calibri" charset="0"/>
+                <a:cs typeface="Calibri" charset="0"/>
               </a:rPr>
               <a:t> </a:t>
             </a:r>
@@ -30877,6 +31214,9 @@
                 <a:solidFill>
                   <a:schemeClr val="tx1"/>
                 </a:solidFill>
+                <a:latin typeface="Calibri" charset="0"/>
+                <a:ea typeface="Calibri" charset="0"/>
+                <a:cs typeface="Calibri" charset="0"/>
               </a:rPr>
               <a:t>Java Developer - </a:t>
             </a:r>
@@ -30885,6 +31225,9 @@
                 <a:solidFill>
                   <a:schemeClr val="tx1"/>
                 </a:solidFill>
+                <a:latin typeface="Calibri" charset="0"/>
+                <a:ea typeface="Calibri" charset="0"/>
+                <a:cs typeface="Calibri" charset="0"/>
                 <a:hlinkClick r:id="rId8"/>
               </a:rPr>
               <a:t>McKesson Provider </a:t>
@@ -30894,6 +31237,9 @@
                 <a:solidFill>
                   <a:schemeClr val="tx1"/>
                 </a:solidFill>
+                <a:latin typeface="Calibri" charset="0"/>
+                <a:ea typeface="Calibri" charset="0"/>
+                <a:cs typeface="Calibri" charset="0"/>
                 <a:hlinkClick r:id="rId8"/>
               </a:rPr>
               <a:t>Technologies</a:t>
@@ -30903,6 +31249,9 @@
                 <a:solidFill>
                   <a:schemeClr val="tx1"/>
                 </a:solidFill>
+                <a:latin typeface="Calibri" charset="0"/>
+                <a:ea typeface="Calibri" charset="0"/>
+                <a:cs typeface="Calibri" charset="0"/>
               </a:rPr>
               <a:t> - Aug </a:t>
             </a:r>
@@ -30911,6 +31260,9 @@
                 <a:solidFill>
                   <a:schemeClr val="tx1"/>
                 </a:solidFill>
+                <a:latin typeface="Calibri" charset="0"/>
+                <a:ea typeface="Calibri" charset="0"/>
+                <a:cs typeface="Calibri" charset="0"/>
               </a:rPr>
               <a:t>2007 – </a:t>
             </a:r>
@@ -30919,6 +31271,9 @@
                 <a:solidFill>
                   <a:schemeClr val="tx1"/>
                 </a:solidFill>
+                <a:latin typeface="Calibri" charset="0"/>
+                <a:ea typeface="Calibri" charset="0"/>
+                <a:cs typeface="Calibri" charset="0"/>
               </a:rPr>
               <a:t>Nov 2010 </a:t>
             </a:r>
@@ -30926,6 +31281,9 @@
               <a:solidFill>
                 <a:schemeClr val="tx1"/>
               </a:solidFill>
+              <a:latin typeface="Calibri" charset="0"/>
+              <a:ea typeface="Calibri" charset="0"/>
+              <a:cs typeface="Calibri" charset="0"/>
             </a:endParaRPr>
           </a:p>
           <a:p>
@@ -30935,6 +31293,9 @@
                 <a:solidFill>
                   <a:schemeClr val="tx1"/>
                 </a:solidFill>
+                <a:latin typeface="Calibri" charset="0"/>
+                <a:ea typeface="Calibri" charset="0"/>
+                <a:cs typeface="Calibri" charset="0"/>
               </a:rPr>
               <a:t>Developed </a:t>
             </a:r>
@@ -30943,6 +31304,9 @@
                 <a:solidFill>
                   <a:schemeClr val="tx1"/>
                 </a:solidFill>
+                <a:latin typeface="Calibri" charset="0"/>
+                <a:ea typeface="Calibri" charset="0"/>
+                <a:cs typeface="Calibri" charset="0"/>
               </a:rPr>
               <a:t>Mapping for processing X12 type of </a:t>
             </a:r>
@@ -30951,6 +31315,9 @@
                 <a:solidFill>
                   <a:schemeClr val="tx1"/>
                 </a:solidFill>
+                <a:latin typeface="Calibri" charset="0"/>
+                <a:ea typeface="Calibri" charset="0"/>
+                <a:cs typeface="Calibri" charset="0"/>
               </a:rPr>
               <a:t>Messaging. As </a:t>
             </a:r>
@@ -30959,6 +31326,9 @@
                 <a:solidFill>
                   <a:schemeClr val="tx1"/>
                 </a:solidFill>
+                <a:latin typeface="Calibri" charset="0"/>
+                <a:ea typeface="Calibri" charset="0"/>
+                <a:cs typeface="Calibri" charset="0"/>
               </a:rPr>
               <a:t>a developer, I have done support and maintenance during all phases of development including Product Integration Testing and fixed the Trouble Reports and </a:t>
             </a:r>
@@ -30967,6 +31337,9 @@
                 <a:solidFill>
                   <a:schemeClr val="tx1"/>
                 </a:solidFill>
+                <a:latin typeface="Calibri" charset="0"/>
+                <a:ea typeface="Calibri" charset="0"/>
+                <a:cs typeface="Calibri" charset="0"/>
               </a:rPr>
               <a:t>bugs. I was a </a:t>
             </a:r>
@@ -30975,6 +31348,9 @@
                 <a:solidFill>
                   <a:schemeClr val="tx1"/>
                 </a:solidFill>
+                <a:latin typeface="Calibri" charset="0"/>
+                <a:ea typeface="Calibri" charset="0"/>
+                <a:cs typeface="Calibri" charset="0"/>
               </a:rPr>
               <a:t>part of </a:t>
             </a:r>
@@ -30983,6 +31359,9 @@
                 <a:solidFill>
                   <a:schemeClr val="tx1"/>
                 </a:solidFill>
+                <a:latin typeface="Calibri" charset="0"/>
+                <a:ea typeface="Calibri" charset="0"/>
+                <a:cs typeface="Calibri" charset="0"/>
               </a:rPr>
               <a:t>some </a:t>
             </a:r>
@@ -30991,6 +31370,9 @@
                 <a:solidFill>
                   <a:schemeClr val="tx1"/>
                 </a:solidFill>
+                <a:latin typeface="Calibri" charset="0"/>
+                <a:ea typeface="Calibri" charset="0"/>
+                <a:cs typeface="Calibri" charset="0"/>
               </a:rPr>
               <a:t>major </a:t>
             </a:r>
@@ -30999,6 +31381,9 @@
                 <a:solidFill>
                   <a:schemeClr val="tx1"/>
                 </a:solidFill>
+                <a:latin typeface="Calibri" charset="0"/>
+                <a:ea typeface="Calibri" charset="0"/>
+                <a:cs typeface="Calibri" charset="0"/>
               </a:rPr>
               <a:t>enhancements in HMS. </a:t>
             </a:r>
@@ -31007,6 +31392,9 @@
                 <a:solidFill>
                   <a:schemeClr val="tx1"/>
                 </a:solidFill>
+                <a:latin typeface="Calibri" charset="0"/>
+                <a:ea typeface="Calibri" charset="0"/>
+                <a:cs typeface="Calibri" charset="0"/>
               </a:rPr>
               <a:t>I have done Coding and Unit Testing for the enhanced modules</a:t>
             </a:r>
@@ -31015,6 +31403,9 @@
                 <a:solidFill>
                   <a:schemeClr val="tx1"/>
                 </a:solidFill>
+                <a:latin typeface="Calibri" charset="0"/>
+                <a:ea typeface="Calibri" charset="0"/>
+                <a:cs typeface="Calibri" charset="0"/>
               </a:rPr>
               <a:t>. I </a:t>
             </a:r>
@@ -31023,15 +31414,12 @@
                 <a:solidFill>
                   <a:schemeClr val="tx1"/>
                 </a:solidFill>
+                <a:latin typeface="Calibri" charset="0"/>
+                <a:ea typeface="Calibri" charset="0"/>
+                <a:cs typeface="Calibri" charset="0"/>
               </a:rPr>
               <a:t>have also worked in support and maintenance phase and deliver clean fixes for critical defects on time. </a:t>
             </a:r>
-            <a:endParaRPr lang="en-GB" sz="1000" dirty="0">
-              <a:solidFill>
-                <a:schemeClr val="tx1"/>
-              </a:solidFill>
-              <a:cs typeface="Arial" pitchFamily="34" charset="0"/>
-            </a:endParaRPr>
           </a:p>
         </p:txBody>
       </p:sp>
@@ -31088,7 +31476,9 @@
                 <a:solidFill>
                   <a:srgbClr val="262626"/>
                 </a:solidFill>
-                <a:cs typeface="Arial"/>
+                <a:latin typeface="Calibri" charset="0"/>
+                <a:ea typeface="Calibri" charset="0"/>
+                <a:cs typeface="Calibri" charset="0"/>
               </a:rPr>
               <a:t>UI Design &amp; Development(HTML5, CSS3, JavaScript, Web Components, </a:t>
             </a:r>
@@ -31097,7 +31487,9 @@
                 <a:solidFill>
                   <a:srgbClr val="262626"/>
                 </a:solidFill>
-                <a:cs typeface="Arial"/>
+                <a:latin typeface="Calibri" charset="0"/>
+                <a:ea typeface="Calibri" charset="0"/>
+                <a:cs typeface="Calibri" charset="0"/>
               </a:rPr>
               <a:t>GWT, Polymer, React, Angular JS)</a:t>
             </a:r>
@@ -31106,7 +31498,9 @@
                 <a:solidFill>
                   <a:srgbClr val="262626"/>
                 </a:solidFill>
-                <a:cs typeface="Arial"/>
+                <a:latin typeface="Calibri" charset="0"/>
+                <a:ea typeface="Calibri" charset="0"/>
+                <a:cs typeface="Calibri" charset="0"/>
               </a:rPr>
               <a:t>, </a:t>
             </a:r>
@@ -31115,7 +31509,9 @@
                 <a:solidFill>
                   <a:srgbClr val="262626"/>
                 </a:solidFill>
-                <a:cs typeface="Arial"/>
+                <a:latin typeface="Calibri" charset="0"/>
+                <a:ea typeface="Calibri" charset="0"/>
+                <a:cs typeface="Calibri" charset="0"/>
               </a:rPr>
               <a:t>Application </a:t>
             </a:r>
@@ -31124,7 +31520,9 @@
                 <a:solidFill>
                   <a:srgbClr val="262626"/>
                 </a:solidFill>
-                <a:cs typeface="Arial"/>
+                <a:latin typeface="Calibri" charset="0"/>
+                <a:ea typeface="Calibri" charset="0"/>
+                <a:cs typeface="Calibri" charset="0"/>
               </a:rPr>
               <a:t>Design &amp; Development(Java/J2EE &amp; MEAN Stack</a:t>
             </a:r>
@@ -31133,7 +31531,9 @@
                 <a:solidFill>
                   <a:srgbClr val="262626"/>
                 </a:solidFill>
-                <a:cs typeface="Arial"/>
+                <a:latin typeface="Calibri" charset="0"/>
+                <a:ea typeface="Calibri" charset="0"/>
+                <a:cs typeface="Calibri" charset="0"/>
               </a:rPr>
               <a:t>), Visual </a:t>
             </a:r>
@@ -31142,7 +31542,9 @@
                 <a:solidFill>
                   <a:srgbClr val="262626"/>
                 </a:solidFill>
-                <a:cs typeface="Arial"/>
+                <a:latin typeface="Calibri" charset="0"/>
+                <a:ea typeface="Calibri" charset="0"/>
+                <a:cs typeface="Calibri" charset="0"/>
               </a:rPr>
               <a:t>Design(Photoshop) &amp; Prototyping, RIA, Responsive Web Design, </a:t>
             </a:r>
@@ -31151,7 +31553,9 @@
                 <a:solidFill>
                   <a:srgbClr val="262626"/>
                 </a:solidFill>
-                <a:cs typeface="Arial"/>
+                <a:latin typeface="Calibri" charset="0"/>
+                <a:ea typeface="Calibri" charset="0"/>
+                <a:cs typeface="Calibri" charset="0"/>
               </a:rPr>
               <a:t>Functional/Reactive </a:t>
             </a:r>
@@ -31160,7 +31564,9 @@
                 <a:solidFill>
                   <a:srgbClr val="262626"/>
                 </a:solidFill>
-                <a:cs typeface="Arial"/>
+                <a:latin typeface="Calibri" charset="0"/>
+                <a:ea typeface="Calibri" charset="0"/>
+                <a:cs typeface="Calibri" charset="0"/>
               </a:rPr>
               <a:t>Programming</a:t>
             </a:r>
@@ -31169,7 +31575,9 @@
                 <a:solidFill>
                   <a:srgbClr val="262626"/>
                 </a:solidFill>
-                <a:cs typeface="Arial"/>
+                <a:latin typeface="Calibri" charset="0"/>
+                <a:ea typeface="Calibri" charset="0"/>
+                <a:cs typeface="Calibri" charset="0"/>
               </a:rPr>
               <a:t>, Standards</a:t>
             </a:r>
@@ -31178,7 +31586,9 @@
                 <a:solidFill>
                   <a:srgbClr val="262626"/>
                 </a:solidFill>
-                <a:cs typeface="Arial"/>
+                <a:latin typeface="Calibri" charset="0"/>
+                <a:ea typeface="Calibri" charset="0"/>
+                <a:cs typeface="Calibri" charset="0"/>
               </a:rPr>
               <a:t>-complaint web development, Motion </a:t>
             </a:r>
@@ -31187,7 +31597,9 @@
                 <a:solidFill>
                   <a:srgbClr val="262626"/>
                 </a:solidFill>
-                <a:cs typeface="Arial"/>
+                <a:latin typeface="Calibri" charset="0"/>
+                <a:ea typeface="Calibri" charset="0"/>
+                <a:cs typeface="Calibri" charset="0"/>
               </a:rPr>
               <a:t>Graphics, a11y Standards</a:t>
             </a:r>
@@ -31196,7 +31608,9 @@
                 <a:solidFill>
                   <a:srgbClr val="262626"/>
                 </a:solidFill>
-                <a:cs typeface="Arial"/>
+                <a:latin typeface="Calibri" charset="0"/>
+                <a:ea typeface="Calibri" charset="0"/>
+                <a:cs typeface="Calibri" charset="0"/>
               </a:rPr>
               <a:t>.</a:t>
             </a:r>
@@ -31204,6 +31618,9 @@
               <a:solidFill>
                 <a:schemeClr val="tx1"/>
               </a:solidFill>
+              <a:latin typeface="Calibri" charset="0"/>
+              <a:ea typeface="Calibri" charset="0"/>
+              <a:cs typeface="Calibri" charset="0"/>
             </a:endParaRPr>
           </a:p>
         </p:txBody>
@@ -31253,8 +31670,9 @@
                 <a:solidFill>
                   <a:srgbClr val="FFFFFF"/>
                 </a:solidFill>
-                <a:latin typeface="Arial" pitchFamily="34" charset="0"/>
-                <a:cs typeface="Arial" pitchFamily="34" charset="0"/>
+                <a:latin typeface="Calibri" charset="0"/>
+                <a:ea typeface="Calibri" charset="0"/>
+                <a:cs typeface="Calibri" charset="0"/>
               </a:rPr>
               <a:t>Projects and Assignments</a:t>
             </a:r>
@@ -31262,8 +31680,9 @@
               <a:solidFill>
                 <a:srgbClr val="FFFFFF"/>
               </a:solidFill>
-              <a:latin typeface="Arial" pitchFamily="34" charset="0"/>
-              <a:cs typeface="Arial" pitchFamily="34" charset="0"/>
+              <a:latin typeface="Calibri" charset="0"/>
+              <a:ea typeface="Calibri" charset="0"/>
+              <a:cs typeface="Calibri" charset="0"/>
             </a:endParaRPr>
           </a:p>
         </p:txBody>
@@ -31313,7 +31732,9 @@
                 <a:solidFill>
                   <a:srgbClr val="FFFFFF"/>
                 </a:solidFill>
-                <a:cs typeface="Arial" pitchFamily="34" charset="0"/>
+                <a:latin typeface="Calibri" charset="0"/>
+                <a:ea typeface="Calibri" charset="0"/>
+                <a:cs typeface="Calibri" charset="0"/>
               </a:rPr>
               <a:t>S</a:t>
             </a:r>
@@ -31322,8 +31743,9 @@
                 <a:solidFill>
                   <a:srgbClr val="FFFFFF"/>
                 </a:solidFill>
-                <a:latin typeface="Arial" pitchFamily="34" charset="0"/>
-                <a:cs typeface="Arial" pitchFamily="34" charset="0"/>
+                <a:latin typeface="Calibri" charset="0"/>
+                <a:ea typeface="Calibri" charset="0"/>
+                <a:cs typeface="Calibri" charset="0"/>
               </a:rPr>
               <a:t>kills and Expertise</a:t>
             </a:r>
@@ -31331,8 +31753,9 @@
               <a:solidFill>
                 <a:srgbClr val="FFFFFF"/>
               </a:solidFill>
-              <a:latin typeface="Arial" pitchFamily="34" charset="0"/>
-              <a:cs typeface="Arial" pitchFamily="34" charset="0"/>
+              <a:latin typeface="Calibri" charset="0"/>
+              <a:ea typeface="Calibri" charset="0"/>
+              <a:cs typeface="Calibri" charset="0"/>
             </a:endParaRPr>
           </a:p>
         </p:txBody>

</xml_diff>